<commit_message>
Another pointless checkstyle, but also cool new images for DevGuide
</commit_message>
<xml_diff>
--- a/docs/diagrams/MeetCommandLogicDiagram2.pptx
+++ b/docs/diagrams/MeetCommandLogicDiagram2.pptx
@@ -3359,8 +3359,8 @@
         </p:nvSpPr>
         <p:spPr>
           <a:xfrm>
-            <a:off x="2441275" y="0"/>
-            <a:ext cx="2820838" cy="5283200"/>
+            <a:off x="2441275" y="1233577"/>
+            <a:ext cx="2820838" cy="2816046"/>
           </a:xfrm>
           <a:prstGeom prst="rect">
             <a:avLst/>
@@ -3599,8 +3599,8 @@
         </p:nvSpPr>
         <p:spPr>
           <a:xfrm>
-            <a:off x="8323915" y="0"/>
-            <a:ext cx="2820838" cy="5283200"/>
+            <a:off x="8323915" y="1233577"/>
+            <a:ext cx="2820838" cy="2816046"/>
           </a:xfrm>
           <a:prstGeom prst="rect">
             <a:avLst/>
@@ -4086,6 +4086,86 @@
               <a:t>18:00</a:t>
             </a:r>
             <a:endParaRPr lang="en-SG" dirty="0"/>
+          </a:p>
+        </p:txBody>
+      </p:sp>
+      <p:sp>
+        <p:nvSpPr>
+          <p:cNvPr id="20" name="Rectangle 19"/>
+          <p:cNvSpPr/>
+          <p:nvPr/>
+        </p:nvSpPr>
+        <p:spPr>
+          <a:xfrm>
+            <a:off x="966158" y="3351361"/>
+            <a:ext cx="974785" cy="629250"/>
+          </a:xfrm>
+          <a:prstGeom prst="rect">
+            <a:avLst/>
+          </a:prstGeom>
+          <a:solidFill>
+            <a:srgbClr val="00B0F0"/>
+          </a:solidFill>
+          <a:ln w="38100">
+            <a:solidFill>
+              <a:schemeClr val="tx1"/>
+            </a:solidFill>
+          </a:ln>
+        </p:spPr>
+        <p:style>
+          <a:lnRef idx="2">
+            <a:schemeClr val="accent1">
+              <a:shade val="50000"/>
+            </a:schemeClr>
+          </a:lnRef>
+          <a:fillRef idx="1">
+            <a:schemeClr val="accent1"/>
+          </a:fillRef>
+          <a:effectRef idx="0">
+            <a:schemeClr val="accent1"/>
+          </a:effectRef>
+          <a:fontRef idx="minor">
+            <a:schemeClr val="lt1"/>
+          </a:fontRef>
+        </p:style>
+        <p:txBody>
+          <a:bodyPr rtlCol="0" anchor="ctr"/>
+          <a:lstStyle/>
+          <a:p>
+            <a:pPr algn="ctr"/>
+            <a:r>
+              <a:rPr lang="en-SG" sz="1400" dirty="0" smtClean="0">
+                <a:solidFill>
+                  <a:schemeClr val="tx1"/>
+                </a:solidFill>
+                <a:latin typeface="Lato" panose="020F0502020204030203" pitchFamily="34" charset="0"/>
+                <a:ea typeface="Lato" panose="020F0502020204030203" pitchFamily="34" charset="0"/>
+                <a:cs typeface="Lato" panose="020F0502020204030203" pitchFamily="34" charset="0"/>
+              </a:rPr>
+              <a:t>meeting</a:t>
+            </a:r>
+          </a:p>
+          <a:p>
+            <a:pPr algn="ctr"/>
+            <a:r>
+              <a:rPr lang="en-SG" sz="1400" dirty="0" smtClean="0">
+                <a:solidFill>
+                  <a:schemeClr val="tx1"/>
+                </a:solidFill>
+                <a:latin typeface="Lato" panose="020F0502020204030203" pitchFamily="34" charset="0"/>
+                <a:ea typeface="Lato" panose="020F0502020204030203" pitchFamily="34" charset="0"/>
+                <a:cs typeface="Lato" panose="020F0502020204030203" pitchFamily="34" charset="0"/>
+              </a:rPr>
+              <a:t>:Event</a:t>
+            </a:r>
+            <a:endParaRPr lang="en-SG" sz="1400" dirty="0">
+              <a:solidFill>
+                <a:schemeClr val="tx1"/>
+              </a:solidFill>
+              <a:latin typeface="Lato" panose="020F0502020204030203" pitchFamily="34" charset="0"/>
+              <a:ea typeface="Lato" panose="020F0502020204030203" pitchFamily="34" charset="0"/>
+              <a:cs typeface="Lato" panose="020F0502020204030203" pitchFamily="34" charset="0"/>
+            </a:endParaRPr>
           </a:p>
         </p:txBody>
       </p:sp>

</xml_diff>